<commit_message>
Final Presentation for today
</commit_message>
<xml_diff>
--- a/PennTechnoGrads.pptx
+++ b/PennTechnoGrads.pptx
@@ -279,7 +279,7 @@
           <a:p>
             <a:fld id="{2D1072F3-C1D6-41E1-BE99-6268B525527E}" type="datetimeFigureOut">
               <a:rPr lang="en-US" smtClean="0"/>
-              <a:t>11/10/2017</a:t>
+              <a:t>11/11/2017</a:t>
             </a:fld>
             <a:endParaRPr lang="en-US"/>
           </a:p>
@@ -477,7 +477,7 @@
           <a:p>
             <a:fld id="{2D1072F3-C1D6-41E1-BE99-6268B525527E}" type="datetimeFigureOut">
               <a:rPr lang="en-US" smtClean="0"/>
-              <a:t>11/10/2017</a:t>
+              <a:t>11/11/2017</a:t>
             </a:fld>
             <a:endParaRPr lang="en-US"/>
           </a:p>
@@ -685,7 +685,7 @@
           <a:p>
             <a:fld id="{2D1072F3-C1D6-41E1-BE99-6268B525527E}" type="datetimeFigureOut">
               <a:rPr lang="en-US" smtClean="0"/>
-              <a:t>11/10/2017</a:t>
+              <a:t>11/11/2017</a:t>
             </a:fld>
             <a:endParaRPr lang="en-US"/>
           </a:p>
@@ -883,7 +883,7 @@
           <a:p>
             <a:fld id="{2D1072F3-C1D6-41E1-BE99-6268B525527E}" type="datetimeFigureOut">
               <a:rPr lang="en-US" smtClean="0"/>
-              <a:t>11/10/2017</a:t>
+              <a:t>11/11/2017</a:t>
             </a:fld>
             <a:endParaRPr lang="en-US"/>
           </a:p>
@@ -1158,7 +1158,7 @@
           <a:p>
             <a:fld id="{2D1072F3-C1D6-41E1-BE99-6268B525527E}" type="datetimeFigureOut">
               <a:rPr lang="en-US" smtClean="0"/>
-              <a:t>11/10/2017</a:t>
+              <a:t>11/11/2017</a:t>
             </a:fld>
             <a:endParaRPr lang="en-US"/>
           </a:p>
@@ -1423,7 +1423,7 @@
           <a:p>
             <a:fld id="{2D1072F3-C1D6-41E1-BE99-6268B525527E}" type="datetimeFigureOut">
               <a:rPr lang="en-US" smtClean="0"/>
-              <a:t>11/10/2017</a:t>
+              <a:t>11/11/2017</a:t>
             </a:fld>
             <a:endParaRPr lang="en-US"/>
           </a:p>
@@ -1835,7 +1835,7 @@
           <a:p>
             <a:fld id="{2D1072F3-C1D6-41E1-BE99-6268B525527E}" type="datetimeFigureOut">
               <a:rPr lang="en-US" smtClean="0"/>
-              <a:t>11/10/2017</a:t>
+              <a:t>11/11/2017</a:t>
             </a:fld>
             <a:endParaRPr lang="en-US"/>
           </a:p>
@@ -1976,7 +1976,7 @@
           <a:p>
             <a:fld id="{2D1072F3-C1D6-41E1-BE99-6268B525527E}" type="datetimeFigureOut">
               <a:rPr lang="en-US" smtClean="0"/>
-              <a:t>11/10/2017</a:t>
+              <a:t>11/11/2017</a:t>
             </a:fld>
             <a:endParaRPr lang="en-US"/>
           </a:p>
@@ -2089,7 +2089,7 @@
           <a:p>
             <a:fld id="{2D1072F3-C1D6-41E1-BE99-6268B525527E}" type="datetimeFigureOut">
               <a:rPr lang="en-US" smtClean="0"/>
-              <a:t>11/10/2017</a:t>
+              <a:t>11/11/2017</a:t>
             </a:fld>
             <a:endParaRPr lang="en-US"/>
           </a:p>
@@ -2400,7 +2400,7 @@
           <a:p>
             <a:fld id="{2D1072F3-C1D6-41E1-BE99-6268B525527E}" type="datetimeFigureOut">
               <a:rPr lang="en-US" smtClean="0"/>
-              <a:t>11/10/2017</a:t>
+              <a:t>11/11/2017</a:t>
             </a:fld>
             <a:endParaRPr lang="en-US"/>
           </a:p>
@@ -2688,7 +2688,7 @@
           <a:p>
             <a:fld id="{2D1072F3-C1D6-41E1-BE99-6268B525527E}" type="datetimeFigureOut">
               <a:rPr lang="en-US" smtClean="0"/>
-              <a:t>11/10/2017</a:t>
+              <a:t>11/11/2017</a:t>
             </a:fld>
             <a:endParaRPr lang="en-US"/>
           </a:p>
@@ -2929,7 +2929,7 @@
           <a:p>
             <a:fld id="{2D1072F3-C1D6-41E1-BE99-6268B525527E}" type="datetimeFigureOut">
               <a:rPr lang="en-US" smtClean="0"/>
-              <a:t>11/10/2017</a:t>
+              <a:t>11/11/2017</a:t>
             </a:fld>
             <a:endParaRPr lang="en-US"/>
           </a:p>
@@ -9105,6 +9105,17 @@
 <file path=ppt/slides/slide17.xml><?xml version="1.0" encoding="utf-8"?>
 <p:sld xmlns:a="http://schemas.openxmlformats.org/drawingml/2006/main" xmlns:r="http://schemas.openxmlformats.org/officeDocument/2006/relationships" xmlns:p="http://schemas.openxmlformats.org/presentationml/2006/main">
   <p:cSld>
+    <p:bg>
+      <p:bgPr>
+        <a:solidFill>
+          <a:schemeClr val="bg1">
+            <a:tint val="95000"/>
+            <a:satMod val="170000"/>
+          </a:schemeClr>
+        </a:solidFill>
+        <a:effectLst/>
+      </p:bgPr>
+    </p:bg>
     <p:spTree>
       <p:nvGrpSpPr>
         <p:cNvPr id="1" name=""/>
@@ -9119,6 +9130,201 @@
           <a:chExt cx="0" cy="0"/>
         </a:xfrm>
       </p:grpSpPr>
+      <p:grpSp>
+        <p:nvGrpSpPr>
+          <p:cNvPr id="14" name="Group 7" title="intersecting circles">
+            <a:extLst>
+              <a:ext uri="{FF2B5EF4-FFF2-40B4-BE49-F238E27FC236}">
+                <a16:creationId xmlns:a16="http://schemas.microsoft.com/office/drawing/2014/main" id="{D2C4BFA1-2075-4901-9E24-E41D1FDD51FD}"/>
+              </a:ext>
+            </a:extLst>
+          </p:cNvPr>
+          <p:cNvGrpSpPr>
+            <a:grpSpLocks noGrp="1" noUngrp="1" noRot="1" noChangeAspect="1" noMove="1" noResize="1"/>
+          </p:cNvGrpSpPr>
+          <p:nvPr>
+            <p:extLst>
+              <p:ext uri="{386F3935-93C4-4BCD-93E2-E3B085C9AB24}">
+                <p16:designElem xmlns:p16="http://schemas.microsoft.com/office/powerpoint/2015/main" val="1"/>
+              </p:ext>
+            </p:extLst>
+          </p:nvPr>
+        </p:nvGrpSpPr>
+        <p:grpSpPr>
+          <a:xfrm>
+            <a:off x="1155481" y="498348"/>
+            <a:ext cx="9902663" cy="5861304"/>
+            <a:chOff x="1155481" y="498348"/>
+            <a:chExt cx="9902663" cy="5861304"/>
+          </a:xfrm>
+        </p:grpSpPr>
+        <p:sp>
+          <p:nvSpPr>
+            <p:cNvPr id="9" name="Oval 5">
+              <a:extLst>
+                <a:ext uri="{FF2B5EF4-FFF2-40B4-BE49-F238E27FC236}">
+                  <a16:creationId xmlns:a16="http://schemas.microsoft.com/office/drawing/2014/main" id="{985A7375-E3AF-4F5C-85AE-17E8832952CA}"/>
+                </a:ext>
+              </a:extLst>
+            </p:cNvPr>
+            <p:cNvSpPr>
+              <a:spLocks noChangeArrowheads="1"/>
+            </p:cNvSpPr>
+            <p:nvPr>
+              <p:extLst>
+                <p:ext uri="{386F3935-93C4-4BCD-93E2-E3B085C9AB24}">
+                  <p16:designElem xmlns:p16="http://schemas.microsoft.com/office/powerpoint/2015/main" val="1"/>
+                </p:ext>
+              </p:extLst>
+            </p:nvPr>
+          </p:nvSpPr>
+          <p:spPr bwMode="auto">
+            <a:xfrm>
+              <a:off x="1155481" y="498348"/>
+              <a:ext cx="5861304" cy="5861304"/>
+            </a:xfrm>
+            <a:prstGeom prst="ellipse">
+              <a:avLst/>
+            </a:prstGeom>
+            <a:solidFill>
+              <a:schemeClr val="accent1">
+                <a:alpha val="55000"/>
+              </a:schemeClr>
+            </a:solidFill>
+            <a:ln>
+              <a:noFill/>
+            </a:ln>
+          </p:spPr>
+        </p:sp>
+        <p:sp>
+          <p:nvSpPr>
+            <p:cNvPr id="15" name="Oval 9">
+              <a:extLst>
+                <a:ext uri="{FF2B5EF4-FFF2-40B4-BE49-F238E27FC236}">
+                  <a16:creationId xmlns:a16="http://schemas.microsoft.com/office/drawing/2014/main" id="{F0307F65-8304-4FA8-A841-D4D7625411BE}"/>
+                </a:ext>
+              </a:extLst>
+            </p:cNvPr>
+            <p:cNvSpPr>
+              <a:spLocks noChangeArrowheads="1"/>
+            </p:cNvSpPr>
+            <p:nvPr>
+              <p:extLst>
+                <p:ext uri="{386F3935-93C4-4BCD-93E2-E3B085C9AB24}">
+                  <p16:designElem xmlns:p16="http://schemas.microsoft.com/office/powerpoint/2015/main" val="1"/>
+                </p:ext>
+              </p:extLst>
+            </p:nvPr>
+          </p:nvSpPr>
+          <p:spPr bwMode="auto">
+            <a:xfrm>
+              <a:off x="5196840" y="498348"/>
+              <a:ext cx="5861304" cy="5861304"/>
+            </a:xfrm>
+            <a:prstGeom prst="ellipse">
+              <a:avLst/>
+            </a:prstGeom>
+            <a:solidFill>
+              <a:schemeClr val="accent1">
+                <a:alpha val="55000"/>
+              </a:schemeClr>
+            </a:solidFill>
+            <a:ln>
+              <a:noFill/>
+            </a:ln>
+          </p:spPr>
+        </p:sp>
+        <p:sp>
+          <p:nvSpPr>
+            <p:cNvPr id="11" name="Oval 5">
+              <a:extLst>
+                <a:ext uri="{FF2B5EF4-FFF2-40B4-BE49-F238E27FC236}">
+                  <a16:creationId xmlns:a16="http://schemas.microsoft.com/office/drawing/2014/main" id="{C8B8394C-136F-4E05-A002-D93A5E79CD50}"/>
+                </a:ext>
+              </a:extLst>
+            </p:cNvPr>
+            <p:cNvSpPr>
+              <a:spLocks noChangeArrowheads="1"/>
+            </p:cNvSpPr>
+            <p:nvPr>
+              <p:extLst>
+                <p:ext uri="{386F3935-93C4-4BCD-93E2-E3B085C9AB24}">
+                  <p16:designElem xmlns:p16="http://schemas.microsoft.com/office/powerpoint/2015/main" val="1"/>
+                </p:ext>
+              </p:extLst>
+            </p:nvPr>
+          </p:nvSpPr>
+          <p:spPr bwMode="auto">
+            <a:xfrm>
+              <a:off x="3165348" y="498348"/>
+              <a:ext cx="5861304" cy="5861304"/>
+            </a:xfrm>
+            <a:prstGeom prst="ellipse">
+              <a:avLst/>
+            </a:prstGeom>
+            <a:solidFill>
+              <a:schemeClr val="accent1">
+                <a:alpha val="70000"/>
+              </a:schemeClr>
+            </a:solidFill>
+            <a:ln>
+              <a:noFill/>
+            </a:ln>
+          </p:spPr>
+        </p:sp>
+      </p:grpSp>
+      <p:sp>
+        <p:nvSpPr>
+          <p:cNvPr id="13" name="Rectangle 12" title="ribbon">
+            <a:extLst>
+              <a:ext uri="{FF2B5EF4-FFF2-40B4-BE49-F238E27FC236}">
+                <a16:creationId xmlns:a16="http://schemas.microsoft.com/office/drawing/2014/main" id="{053FB2EE-284F-4C87-AB3D-BBF87A9FAB97}"/>
+              </a:ext>
+            </a:extLst>
+          </p:cNvPr>
+          <p:cNvSpPr>
+            <a:spLocks noGrp="1" noRot="1" noChangeAspect="1" noMove="1" noResize="1" noEditPoints="1" noAdjustHandles="1" noChangeArrowheads="1" noChangeShapeType="1" noTextEdit="1"/>
+          </p:cNvSpPr>
+          <p:nvPr>
+            <p:extLst>
+              <p:ext uri="{386F3935-93C4-4BCD-93E2-E3B085C9AB24}">
+                <p16:designElem xmlns:p16="http://schemas.microsoft.com/office/powerpoint/2015/main" val="1"/>
+              </p:ext>
+            </p:extLst>
+          </p:nvPr>
+        </p:nvSpPr>
+        <p:spPr>
+          <a:xfrm>
+            <a:off x="0" y="2514600"/>
+            <a:ext cx="12192000" cy="1828800"/>
+          </a:xfrm>
+          <a:prstGeom prst="rect">
+            <a:avLst/>
+          </a:prstGeom>
+          <a:solidFill>
+            <a:schemeClr val="tx2"/>
+          </a:solidFill>
+          <a:ln>
+            <a:noFill/>
+          </a:ln>
+        </p:spPr>
+        <p:style>
+          <a:lnRef idx="2">
+            <a:schemeClr val="accent1">
+              <a:shade val="50000"/>
+            </a:schemeClr>
+          </a:lnRef>
+          <a:fillRef idx="1">
+            <a:schemeClr val="accent1"/>
+          </a:fillRef>
+          <a:effectRef idx="0">
+            <a:schemeClr val="accent1"/>
+          </a:effectRef>
+          <a:fontRef idx="minor">
+            <a:schemeClr val="lt1"/>
+          </a:fontRef>
+        </p:style>
+      </p:sp>
       <p:sp>
         <p:nvSpPr>
           <p:cNvPr id="2" name="Title 1">
@@ -9135,37 +9341,30 @@
             <p:ph type="title"/>
           </p:nvPr>
         </p:nvSpPr>
-        <p:spPr/>
+        <p:spPr>
+          <a:xfrm>
+            <a:off x="1524000" y="2776538"/>
+            <a:ext cx="9144000" cy="1381188"/>
+          </a:xfrm>
+        </p:spPr>
         <p:txBody>
-          <a:bodyPr/>
+          <a:bodyPr vert="horz" lIns="91440" tIns="45720" rIns="91440" bIns="45720" rtlCol="0" anchor="ctr">
+            <a:normAutofit/>
+          </a:bodyPr>
           <a:lstStyle/>
           <a:p>
-            <a:endParaRPr lang="en-US"/>
-          </a:p>
-        </p:txBody>
-      </p:sp>
-      <p:sp>
-        <p:nvSpPr>
-          <p:cNvPr id="3" name="Content Placeholder 2">
-            <a:extLst>
-              <a:ext uri="{FF2B5EF4-FFF2-40B4-BE49-F238E27FC236}">
-                <a16:creationId xmlns:a16="http://schemas.microsoft.com/office/drawing/2014/main" id="{F30BA2D6-0279-4828-9C12-E4924258A92F}"/>
-              </a:ext>
-            </a:extLst>
-          </p:cNvPr>
-          <p:cNvSpPr>
-            <a:spLocks noGrp="1"/>
-          </p:cNvSpPr>
-          <p:nvPr>
-            <p:ph idx="1"/>
-          </p:nvPr>
-        </p:nvSpPr>
-        <p:spPr/>
-        <p:txBody>
-          <a:bodyPr/>
-          <a:lstStyle/>
-          <a:p>
-            <a:endParaRPr lang="en-US"/>
+            <a:pPr algn="ctr"/>
+            <a:r>
+              <a:rPr lang="en-US" sz="4000" kern="1200">
+                <a:solidFill>
+                  <a:schemeClr val="bg2"/>
+                </a:solidFill>
+                <a:latin typeface="+mj-lt"/>
+                <a:ea typeface="+mj-ea"/>
+                <a:cs typeface="+mj-cs"/>
+              </a:rPr>
+              <a:t>Questions?</a:t>
+            </a:r>
           </a:p>
         </p:txBody>
       </p:sp>
@@ -9177,7 +9376,7 @@
     </p:extLst>
   </p:cSld>
   <p:clrMapOvr>
-    <a:masterClrMapping/>
+    <a:overrideClrMapping bg1="dk1" tx1="lt1" bg2="dk2" tx2="lt2" accent1="accent1" accent2="accent2" accent3="accent3" accent4="accent4" accent5="accent5" accent6="accent6" hlink="hlink" folHlink="folHlink"/>
   </p:clrMapOvr>
 </p:sld>
 </file>

</xml_diff>

<commit_message>
Added new test file and added garbage text to ppt
</commit_message>
<xml_diff>
--- a/PennTechnoGrads.pptx
+++ b/PennTechnoGrads.pptx
@@ -5682,6 +5682,41 @@
                 </a:solidFill>
               </a:rPr>
               <a:t>-Nirav Shah</a:t>
+            </a:r>
+          </a:p>
+        </p:txBody>
+      </p:sp>
+      <p:sp>
+        <p:nvSpPr>
+          <p:cNvPr id="4" name="TextBox 3">
+            <a:extLst>
+              <a:ext uri="{FF2B5EF4-FFF2-40B4-BE49-F238E27FC236}">
+                <a16:creationId xmlns:a16="http://schemas.microsoft.com/office/drawing/2014/main" id="{B5DCC5C4-BFDE-492C-9A3D-64E94D554B7A}"/>
+              </a:ext>
+            </a:extLst>
+          </p:cNvPr>
+          <p:cNvSpPr txBox="1"/>
+          <p:nvPr/>
+        </p:nvSpPr>
+        <p:spPr>
+          <a:xfrm>
+            <a:off x="6831857" y="858982"/>
+            <a:ext cx="45719" cy="5355312"/>
+          </a:xfrm>
+          <a:prstGeom prst="rect">
+            <a:avLst/>
+          </a:prstGeom>
+          <a:noFill/>
+        </p:spPr>
+        <p:txBody>
+          <a:bodyPr wrap="square" rtlCol="0">
+            <a:spAutoFit/>
+          </a:bodyPr>
+          <a:lstStyle/>
+          <a:p>
+            <a:r>
+              <a:rPr lang="en-US"/>
+              <a:t>dhasudyiusadyiewdsa</a:t>
             </a:r>
           </a:p>
         </p:txBody>

</xml_diff>